<commit_message>
Cleaned up analysis chapter - More work needed though
</commit_message>
<xml_diff>
--- a/src/img/statespaceanalysischapter.pptx
+++ b/src/img/statespaceanalysischapter.pptx
@@ -7,6 +7,7 @@
   <p:sldIdLst>
     <p:sldId id="256" r:id="rId2"/>
     <p:sldId id="257" r:id="rId3"/>
+    <p:sldId id="258" r:id="rId4"/>
   </p:sldIdLst>
   <p:sldSz cx="12192000" cy="6858000"/>
   <p:notesSz cx="6858000" cy="9144000"/>
@@ -105,6 +106,11 @@
       </a:defRPr>
     </a:lvl9pPr>
   </p:defaultTextStyle>
+  <p:extLst>
+    <p:ext uri="{EFAFB233-063F-42B5-8137-9DF3F51BA10A}">
+      <p15:sldGuideLst xmlns:p15="http://schemas.microsoft.com/office/powerpoint/2012/main"/>
+    </p:ext>
+  </p:extLst>
 </p:presentation>
 </file>
 
@@ -153,7 +159,6 @@
               <a:rPr lang="en-US"/>
               <a:t>Click to edit Master title style</a:t>
             </a:r>
-            <a:endParaRPr lang="en-US"/>
           </a:p>
         </p:txBody>
       </p:sp>
@@ -218,7 +223,6 @@
               <a:rPr lang="en-US"/>
               <a:t>Click to edit Master subtitle style</a:t>
             </a:r>
-            <a:endParaRPr lang="en-US"/>
           </a:p>
         </p:txBody>
       </p:sp>
@@ -239,7 +243,7 @@
           <a:p>
             <a:fld id="{FF3D639A-ABF3-4D4D-8C1A-914DEE512EA5}" type="datetimeFigureOut">
               <a:rPr lang="en-US" smtClean="0"/>
-              <a:t>4/14/2016</a:t>
+              <a:t>4/15/2016</a:t>
             </a:fld>
             <a:endParaRPr lang="en-US"/>
           </a:p>
@@ -336,7 +340,6 @@
               <a:rPr lang="en-US"/>
               <a:t>Click to edit Master title style</a:t>
             </a:r>
-            <a:endParaRPr lang="en-US"/>
           </a:p>
         </p:txBody>
       </p:sp>
@@ -388,7 +391,6 @@
               <a:rPr lang="en-US"/>
               <a:t>Fifth level</a:t>
             </a:r>
-            <a:endParaRPr lang="en-US"/>
           </a:p>
         </p:txBody>
       </p:sp>
@@ -409,7 +411,7 @@
           <a:p>
             <a:fld id="{FF3D639A-ABF3-4D4D-8C1A-914DEE512EA5}" type="datetimeFigureOut">
               <a:rPr lang="en-US" smtClean="0"/>
-              <a:t>4/14/2016</a:t>
+              <a:t>4/15/2016</a:t>
             </a:fld>
             <a:endParaRPr lang="en-US"/>
           </a:p>
@@ -511,7 +513,6 @@
               <a:rPr lang="en-US"/>
               <a:t>Click to edit Master title style</a:t>
             </a:r>
-            <a:endParaRPr lang="en-US"/>
           </a:p>
         </p:txBody>
       </p:sp>
@@ -568,7 +569,6 @@
               <a:rPr lang="en-US"/>
               <a:t>Fifth level</a:t>
             </a:r>
-            <a:endParaRPr lang="en-US"/>
           </a:p>
         </p:txBody>
       </p:sp>
@@ -589,7 +589,7 @@
           <a:p>
             <a:fld id="{FF3D639A-ABF3-4D4D-8C1A-914DEE512EA5}" type="datetimeFigureOut">
               <a:rPr lang="en-US" smtClean="0"/>
-              <a:t>4/14/2016</a:t>
+              <a:t>4/15/2016</a:t>
             </a:fld>
             <a:endParaRPr lang="en-US"/>
           </a:p>
@@ -686,7 +686,6 @@
               <a:rPr lang="en-US"/>
               <a:t>Click to edit Master title style</a:t>
             </a:r>
-            <a:endParaRPr lang="en-US"/>
           </a:p>
         </p:txBody>
       </p:sp>
@@ -738,7 +737,6 @@
               <a:rPr lang="en-US"/>
               <a:t>Fifth level</a:t>
             </a:r>
-            <a:endParaRPr lang="en-US"/>
           </a:p>
         </p:txBody>
       </p:sp>
@@ -759,7 +757,7 @@
           <a:p>
             <a:fld id="{FF3D639A-ABF3-4D4D-8C1A-914DEE512EA5}" type="datetimeFigureOut">
               <a:rPr lang="en-US" smtClean="0"/>
-              <a:t>4/14/2016</a:t>
+              <a:t>4/15/2016</a:t>
             </a:fld>
             <a:endParaRPr lang="en-US"/>
           </a:p>
@@ -865,7 +863,6 @@
               <a:rPr lang="en-US"/>
               <a:t>Click to edit Master title style</a:t>
             </a:r>
-            <a:endParaRPr lang="en-US"/>
           </a:p>
         </p:txBody>
       </p:sp>
@@ -1005,7 +1002,7 @@
           <a:p>
             <a:fld id="{FF3D639A-ABF3-4D4D-8C1A-914DEE512EA5}" type="datetimeFigureOut">
               <a:rPr lang="en-US" smtClean="0"/>
-              <a:t>4/14/2016</a:t>
+              <a:t>4/15/2016</a:t>
             </a:fld>
             <a:endParaRPr lang="en-US"/>
           </a:p>
@@ -1102,7 +1099,6 @@
               <a:rPr lang="en-US"/>
               <a:t>Click to edit Master title style</a:t>
             </a:r>
-            <a:endParaRPr lang="en-US"/>
           </a:p>
         </p:txBody>
       </p:sp>
@@ -1159,7 +1155,6 @@
               <a:rPr lang="en-US"/>
               <a:t>Fifth level</a:t>
             </a:r>
-            <a:endParaRPr lang="en-US"/>
           </a:p>
         </p:txBody>
       </p:sp>
@@ -1216,7 +1211,6 @@
               <a:rPr lang="en-US"/>
               <a:t>Fifth level</a:t>
             </a:r>
-            <a:endParaRPr lang="en-US"/>
           </a:p>
         </p:txBody>
       </p:sp>
@@ -1237,7 +1231,7 @@
           <a:p>
             <a:fld id="{FF3D639A-ABF3-4D4D-8C1A-914DEE512EA5}" type="datetimeFigureOut">
               <a:rPr lang="en-US" smtClean="0"/>
-              <a:t>4/14/2016</a:t>
+              <a:t>4/15/2016</a:t>
             </a:fld>
             <a:endParaRPr lang="en-US"/>
           </a:p>
@@ -1339,7 +1333,6 @@
               <a:rPr lang="en-US"/>
               <a:t>Click to edit Master title style</a:t>
             </a:r>
-            <a:endParaRPr lang="en-US"/>
           </a:p>
         </p:txBody>
       </p:sp>
@@ -1461,7 +1454,6 @@
               <a:rPr lang="en-US"/>
               <a:t>Fifth level</a:t>
             </a:r>
-            <a:endParaRPr lang="en-US"/>
           </a:p>
         </p:txBody>
       </p:sp>
@@ -1583,7 +1575,6 @@
               <a:rPr lang="en-US"/>
               <a:t>Fifth level</a:t>
             </a:r>
-            <a:endParaRPr lang="en-US"/>
           </a:p>
         </p:txBody>
       </p:sp>
@@ -1604,7 +1595,7 @@
           <a:p>
             <a:fld id="{FF3D639A-ABF3-4D4D-8C1A-914DEE512EA5}" type="datetimeFigureOut">
               <a:rPr lang="en-US" smtClean="0"/>
-              <a:t>4/14/2016</a:t>
+              <a:t>4/15/2016</a:t>
             </a:fld>
             <a:endParaRPr lang="en-US"/>
           </a:p>
@@ -1701,7 +1692,6 @@
               <a:rPr lang="en-US"/>
               <a:t>Click to edit Master title style</a:t>
             </a:r>
-            <a:endParaRPr lang="en-US"/>
           </a:p>
         </p:txBody>
       </p:sp>
@@ -1722,7 +1712,7 @@
           <a:p>
             <a:fld id="{FF3D639A-ABF3-4D4D-8C1A-914DEE512EA5}" type="datetimeFigureOut">
               <a:rPr lang="en-US" smtClean="0"/>
-              <a:t>4/14/2016</a:t>
+              <a:t>4/15/2016</a:t>
             </a:fld>
             <a:endParaRPr lang="en-US"/>
           </a:p>
@@ -1817,7 +1807,7 @@
           <a:p>
             <a:fld id="{FF3D639A-ABF3-4D4D-8C1A-914DEE512EA5}" type="datetimeFigureOut">
               <a:rPr lang="en-US" smtClean="0"/>
-              <a:t>4/14/2016</a:t>
+              <a:t>4/15/2016</a:t>
             </a:fld>
             <a:endParaRPr lang="en-US"/>
           </a:p>
@@ -1923,7 +1913,6 @@
               <a:rPr lang="en-US"/>
               <a:t>Click to edit Master title style</a:t>
             </a:r>
-            <a:endParaRPr lang="en-US"/>
           </a:p>
         </p:txBody>
       </p:sp>
@@ -2008,7 +1997,6 @@
               <a:rPr lang="en-US"/>
               <a:t>Fifth level</a:t>
             </a:r>
-            <a:endParaRPr lang="en-US"/>
           </a:p>
         </p:txBody>
       </p:sp>
@@ -2094,7 +2082,7 @@
           <a:p>
             <a:fld id="{FF3D639A-ABF3-4D4D-8C1A-914DEE512EA5}" type="datetimeFigureOut">
               <a:rPr lang="en-US" smtClean="0"/>
-              <a:t>4/14/2016</a:t>
+              <a:t>4/15/2016</a:t>
             </a:fld>
             <a:endParaRPr lang="en-US"/>
           </a:p>
@@ -2200,7 +2188,6 @@
               <a:rPr lang="en-US"/>
               <a:t>Click to edit Master title style</a:t>
             </a:r>
-            <a:endParaRPr lang="en-US"/>
           </a:p>
         </p:txBody>
       </p:sp>
@@ -2347,7 +2334,7 @@
           <a:p>
             <a:fld id="{FF3D639A-ABF3-4D4D-8C1A-914DEE512EA5}" type="datetimeFigureOut">
               <a:rPr lang="en-US" smtClean="0"/>
-              <a:t>4/14/2016</a:t>
+              <a:t>4/15/2016</a:t>
             </a:fld>
             <a:endParaRPr lang="en-US"/>
           </a:p>
@@ -2459,7 +2446,6 @@
               <a:rPr lang="en-US"/>
               <a:t>Click to edit Master title style</a:t>
             </a:r>
-            <a:endParaRPr lang="en-US"/>
           </a:p>
         </p:txBody>
       </p:sp>
@@ -2521,7 +2507,6 @@
               <a:rPr lang="en-US"/>
               <a:t>Fifth level</a:t>
             </a:r>
-            <a:endParaRPr lang="en-US"/>
           </a:p>
         </p:txBody>
       </p:sp>
@@ -2560,7 +2545,7 @@
           <a:p>
             <a:fld id="{FF3D639A-ABF3-4D4D-8C1A-914DEE512EA5}" type="datetimeFigureOut">
               <a:rPr lang="en-US" smtClean="0"/>
-              <a:t>4/14/2016</a:t>
+              <a:t>4/15/2016</a:t>
             </a:fld>
             <a:endParaRPr lang="en-US"/>
           </a:p>
@@ -3910,6 +3895,421 @@
 </p:sld>
 </file>
 
+<file path=ppt/slides/slide3.xml><?xml version="1.0" encoding="utf-8"?>
+<p:sld xmlns:a="http://schemas.openxmlformats.org/drawingml/2006/main" xmlns:r="http://schemas.openxmlformats.org/officeDocument/2006/relationships" xmlns:p="http://schemas.openxmlformats.org/presentationml/2006/main">
+  <p:cSld>
+    <p:spTree>
+      <p:nvGrpSpPr>
+        <p:cNvPr id="1" name=""/>
+        <p:cNvGrpSpPr/>
+        <p:nvPr/>
+      </p:nvGrpSpPr>
+      <p:grpSpPr>
+        <a:xfrm>
+          <a:off x="0" y="0"/>
+          <a:ext cx="0" cy="0"/>
+          <a:chOff x="0" y="0"/>
+          <a:chExt cx="0" cy="0"/>
+        </a:xfrm>
+      </p:grpSpPr>
+      <p:sp>
+        <p:nvSpPr>
+          <p:cNvPr id="4" name="Rectangle 3"/>
+          <p:cNvSpPr/>
+          <p:nvPr/>
+        </p:nvSpPr>
+        <p:spPr>
+          <a:xfrm>
+            <a:off x="2062843" y="1366156"/>
+            <a:ext cx="7875814" cy="4414157"/>
+          </a:xfrm>
+          <a:prstGeom prst="rect">
+            <a:avLst/>
+          </a:prstGeom>
+          <a:solidFill>
+            <a:schemeClr val="bg1"/>
+          </a:solidFill>
+        </p:spPr>
+        <p:style>
+          <a:lnRef idx="2">
+            <a:schemeClr val="accent1">
+              <a:shade val="50000"/>
+            </a:schemeClr>
+          </a:lnRef>
+          <a:fillRef idx="1">
+            <a:schemeClr val="accent1"/>
+          </a:fillRef>
+          <a:effectRef idx="0">
+            <a:schemeClr val="accent1"/>
+          </a:effectRef>
+          <a:fontRef idx="minor">
+            <a:schemeClr val="lt1"/>
+          </a:fontRef>
+        </p:style>
+        <p:txBody>
+          <a:bodyPr rtlCol="0" anchor="ctr"/>
+          <a:lstStyle/>
+          <a:p>
+            <a:r>
+              <a:rPr lang="en-US" sz="2000" b="1" dirty="0">
+                <a:solidFill>
+                  <a:srgbClr val="C00000"/>
+                </a:solidFill>
+                <a:latin typeface="Courier New" panose="02070309020205020404" pitchFamily="49" charset="0"/>
+                <a:cs typeface="Courier New" panose="02070309020205020404" pitchFamily="49" charset="0"/>
+              </a:rPr>
+              <a:t>SearchNodes</a:t>
+            </a:r>
+            <a:r>
+              <a:rPr lang="en-US" sz="2000" b="1" dirty="0">
+                <a:solidFill>
+                  <a:schemeClr val="tx1"/>
+                </a:solidFill>
+                <a:latin typeface="Courier New" panose="02070309020205020404" pitchFamily="49" charset="0"/>
+                <a:cs typeface="Courier New" panose="02070309020205020404" pitchFamily="49" charset="0"/>
+              </a:rPr>
+              <a:t>(Area, Pred, Limit, </a:t>
+            </a:r>
+            <a:r>
+              <a:rPr lang="en-US" sz="2000" b="1" dirty="0" err="1">
+                <a:solidFill>
+                  <a:schemeClr val="tx1"/>
+                </a:solidFill>
+                <a:latin typeface="Courier New" panose="02070309020205020404" pitchFamily="49" charset="0"/>
+                <a:cs typeface="Courier New" panose="02070309020205020404" pitchFamily="49" charset="0"/>
+              </a:rPr>
+              <a:t>Eval</a:t>
+            </a:r>
+            <a:r>
+              <a:rPr lang="en-US" sz="2000" b="1" dirty="0">
+                <a:solidFill>
+                  <a:schemeClr val="tx1"/>
+                </a:solidFill>
+                <a:latin typeface="Courier New" panose="02070309020205020404" pitchFamily="49" charset="0"/>
+                <a:cs typeface="Courier New" panose="02070309020205020404" pitchFamily="49" charset="0"/>
+              </a:rPr>
+              <a:t>, Start, Comb)</a:t>
+            </a:r>
+          </a:p>
+          <a:p>
+            <a:r>
+              <a:rPr lang="en-US" sz="2000" b="1" dirty="0">
+                <a:solidFill>
+                  <a:schemeClr val="tx1"/>
+                </a:solidFill>
+                <a:latin typeface="Courier New" panose="02070309020205020404" pitchFamily="49" charset="0"/>
+                <a:cs typeface="Courier New" panose="02070309020205020404" pitchFamily="49" charset="0"/>
+              </a:rPr>
+              <a:t>  begin </a:t>
+            </a:r>
+          </a:p>
+          <a:p>
+            <a:r>
+              <a:rPr lang="en-US" sz="2000" b="1" dirty="0">
+                <a:solidFill>
+                  <a:schemeClr val="tx1"/>
+                </a:solidFill>
+                <a:latin typeface="Courier New" panose="02070309020205020404" pitchFamily="49" charset="0"/>
+                <a:cs typeface="Courier New" panose="02070309020205020404" pitchFamily="49" charset="0"/>
+              </a:rPr>
+              <a:t>    Result := Start; Found := 0 </a:t>
+            </a:r>
+          </a:p>
+          <a:p>
+            <a:r>
+              <a:rPr lang="en-US" sz="2000" b="1" dirty="0">
+                <a:solidFill>
+                  <a:schemeClr val="tx1"/>
+                </a:solidFill>
+                <a:latin typeface="Courier New" panose="02070309020205020404" pitchFamily="49" charset="0"/>
+                <a:cs typeface="Courier New" panose="02070309020205020404" pitchFamily="49" charset="0"/>
+              </a:rPr>
+              <a:t>    </a:t>
+            </a:r>
+            <a:r>
+              <a:rPr lang="en-US" sz="2000" b="1" dirty="0">
+                <a:solidFill>
+                  <a:srgbClr val="7030A0"/>
+                </a:solidFill>
+                <a:latin typeface="Courier New" panose="02070309020205020404" pitchFamily="49" charset="0"/>
+                <a:cs typeface="Courier New" panose="02070309020205020404" pitchFamily="49" charset="0"/>
+              </a:rPr>
+              <a:t>for</a:t>
+            </a:r>
+            <a:r>
+              <a:rPr lang="en-US" sz="2000" b="1" dirty="0">
+                <a:solidFill>
+                  <a:schemeClr val="tx1"/>
+                </a:solidFill>
+                <a:latin typeface="Courier New" panose="02070309020205020404" pitchFamily="49" charset="0"/>
+                <a:cs typeface="Courier New" panose="02070309020205020404" pitchFamily="49" charset="0"/>
+              </a:rPr>
+              <a:t> all n ∈ Area do </a:t>
+            </a:r>
+          </a:p>
+          <a:p>
+            <a:r>
+              <a:rPr lang="en-US" sz="2000" b="1" dirty="0">
+                <a:solidFill>
+                  <a:schemeClr val="tx1"/>
+                </a:solidFill>
+                <a:latin typeface="Courier New" panose="02070309020205020404" pitchFamily="49" charset="0"/>
+                <a:cs typeface="Courier New" panose="02070309020205020404" pitchFamily="49" charset="0"/>
+              </a:rPr>
+              <a:t>      </a:t>
+            </a:r>
+            <a:r>
+              <a:rPr lang="en-US" sz="2000" b="1" dirty="0">
+                <a:solidFill>
+                  <a:srgbClr val="0070C0"/>
+                </a:solidFill>
+                <a:latin typeface="Courier New" panose="02070309020205020404" pitchFamily="49" charset="0"/>
+                <a:cs typeface="Courier New" panose="02070309020205020404" pitchFamily="49" charset="0"/>
+              </a:rPr>
+              <a:t>if</a:t>
+            </a:r>
+            <a:r>
+              <a:rPr lang="en-US" sz="2000" b="1" dirty="0">
+                <a:solidFill>
+                  <a:schemeClr val="tx1"/>
+                </a:solidFill>
+                <a:latin typeface="Courier New" panose="02070309020205020404" pitchFamily="49" charset="0"/>
+                <a:cs typeface="Courier New" panose="02070309020205020404" pitchFamily="49" charset="0"/>
+              </a:rPr>
+              <a:t> Pred(n) </a:t>
+            </a:r>
+            <a:r>
+              <a:rPr lang="en-US" sz="2000" b="1" dirty="0">
+                <a:solidFill>
+                  <a:srgbClr val="0070C0"/>
+                </a:solidFill>
+                <a:latin typeface="Courier New" panose="02070309020205020404" pitchFamily="49" charset="0"/>
+                <a:cs typeface="Courier New" panose="02070309020205020404" pitchFamily="49" charset="0"/>
+              </a:rPr>
+              <a:t>then</a:t>
+            </a:r>
+            <a:r>
+              <a:rPr lang="en-US" sz="2000" b="1" dirty="0">
+                <a:solidFill>
+                  <a:schemeClr val="tx1"/>
+                </a:solidFill>
+                <a:latin typeface="Courier New" panose="02070309020205020404" pitchFamily="49" charset="0"/>
+                <a:cs typeface="Courier New" panose="02070309020205020404" pitchFamily="49" charset="0"/>
+              </a:rPr>
+              <a:t> </a:t>
+            </a:r>
+          </a:p>
+          <a:p>
+            <a:r>
+              <a:rPr lang="en-US" sz="2000" b="1" dirty="0">
+                <a:solidFill>
+                  <a:schemeClr val="tx1"/>
+                </a:solidFill>
+                <a:latin typeface="Courier New" panose="02070309020205020404" pitchFamily="49" charset="0"/>
+                <a:cs typeface="Courier New" panose="02070309020205020404" pitchFamily="49" charset="0"/>
+              </a:rPr>
+              <a:t>        begin </a:t>
+            </a:r>
+          </a:p>
+          <a:p>
+            <a:r>
+              <a:rPr lang="en-US" sz="2000" b="1" dirty="0">
+                <a:solidFill>
+                  <a:schemeClr val="tx1"/>
+                </a:solidFill>
+                <a:latin typeface="Courier New" panose="02070309020205020404" pitchFamily="49" charset="0"/>
+                <a:cs typeface="Courier New" panose="02070309020205020404" pitchFamily="49" charset="0"/>
+              </a:rPr>
+              <a:t>           Result := Comb(</a:t>
+            </a:r>
+            <a:r>
+              <a:rPr lang="en-US" sz="2000" b="1" dirty="0" err="1">
+                <a:solidFill>
+                  <a:schemeClr val="tx1"/>
+                </a:solidFill>
+                <a:latin typeface="Courier New" panose="02070309020205020404" pitchFamily="49" charset="0"/>
+                <a:cs typeface="Courier New" panose="02070309020205020404" pitchFamily="49" charset="0"/>
+              </a:rPr>
+              <a:t>Eval</a:t>
+            </a:r>
+            <a:r>
+              <a:rPr lang="en-US" sz="2000" b="1" dirty="0">
+                <a:solidFill>
+                  <a:schemeClr val="tx1"/>
+                </a:solidFill>
+                <a:latin typeface="Courier New" panose="02070309020205020404" pitchFamily="49" charset="0"/>
+                <a:cs typeface="Courier New" panose="02070309020205020404" pitchFamily="49" charset="0"/>
+              </a:rPr>
+              <a:t>(n),Result) </a:t>
+            </a:r>
+          </a:p>
+          <a:p>
+            <a:r>
+              <a:rPr lang="en-US" sz="2000" b="1" dirty="0">
+                <a:solidFill>
+                  <a:schemeClr val="tx1"/>
+                </a:solidFill>
+                <a:latin typeface="Courier New" panose="02070309020205020404" pitchFamily="49" charset="0"/>
+                <a:cs typeface="Courier New" panose="02070309020205020404" pitchFamily="49" charset="0"/>
+              </a:rPr>
+              <a:t>           Found := Found + 1 </a:t>
+            </a:r>
+          </a:p>
+          <a:p>
+            <a:r>
+              <a:rPr lang="en-US" sz="2000" b="1" dirty="0">
+                <a:solidFill>
+                  <a:schemeClr val="tx1"/>
+                </a:solidFill>
+                <a:latin typeface="Courier New" panose="02070309020205020404" pitchFamily="49" charset="0"/>
+                <a:cs typeface="Courier New" panose="02070309020205020404" pitchFamily="49" charset="0"/>
+              </a:rPr>
+              <a:t>	   </a:t>
+            </a:r>
+            <a:r>
+              <a:rPr lang="en-US" sz="2000" b="1" dirty="0">
+                <a:solidFill>
+                  <a:srgbClr val="0070C0"/>
+                </a:solidFill>
+                <a:latin typeface="Courier New" panose="02070309020205020404" pitchFamily="49" charset="0"/>
+                <a:cs typeface="Courier New" panose="02070309020205020404" pitchFamily="49" charset="0"/>
+              </a:rPr>
+              <a:t>if</a:t>
+            </a:r>
+            <a:r>
+              <a:rPr lang="en-US" sz="2000" b="1" dirty="0">
+                <a:solidFill>
+                  <a:schemeClr val="tx1"/>
+                </a:solidFill>
+                <a:latin typeface="Courier New" panose="02070309020205020404" pitchFamily="49" charset="0"/>
+                <a:cs typeface="Courier New" panose="02070309020205020404" pitchFamily="49" charset="0"/>
+              </a:rPr>
+              <a:t> Found = Limit </a:t>
+            </a:r>
+            <a:r>
+              <a:rPr lang="en-US" sz="2000" b="1" dirty="0">
+                <a:solidFill>
+                  <a:srgbClr val="0070C0"/>
+                </a:solidFill>
+                <a:latin typeface="Courier New" panose="02070309020205020404" pitchFamily="49" charset="0"/>
+                <a:cs typeface="Courier New" panose="02070309020205020404" pitchFamily="49" charset="0"/>
+              </a:rPr>
+              <a:t>then</a:t>
+            </a:r>
+            <a:r>
+              <a:rPr lang="en-US" sz="2000" b="1" dirty="0">
+                <a:solidFill>
+                  <a:schemeClr val="tx1"/>
+                </a:solidFill>
+                <a:latin typeface="Courier New" panose="02070309020205020404" pitchFamily="49" charset="0"/>
+                <a:cs typeface="Courier New" panose="02070309020205020404" pitchFamily="49" charset="0"/>
+              </a:rPr>
+              <a:t> </a:t>
+            </a:r>
+          </a:p>
+          <a:p>
+            <a:r>
+              <a:rPr lang="en-US" sz="2000" b="1" dirty="0">
+                <a:solidFill>
+                  <a:schemeClr val="tx1"/>
+                </a:solidFill>
+                <a:latin typeface="Courier New" panose="02070309020205020404" pitchFamily="49" charset="0"/>
+                <a:cs typeface="Courier New" panose="02070309020205020404" pitchFamily="49" charset="0"/>
+              </a:rPr>
+              <a:t>              stop for-loop </a:t>
+            </a:r>
+          </a:p>
+          <a:p>
+            <a:r>
+              <a:rPr lang="en-US" sz="2000" b="1" dirty="0">
+                <a:solidFill>
+                  <a:schemeClr val="tx1"/>
+                </a:solidFill>
+                <a:latin typeface="Courier New" panose="02070309020205020404" pitchFamily="49" charset="0"/>
+                <a:cs typeface="Courier New" panose="02070309020205020404" pitchFamily="49" charset="0"/>
+              </a:rPr>
+              <a:t>         </a:t>
+            </a:r>
+            <a:r>
+              <a:rPr lang="en-US" sz="2000" b="1" dirty="0">
+                <a:solidFill>
+                  <a:srgbClr val="0070C0"/>
+                </a:solidFill>
+                <a:latin typeface="Courier New" panose="02070309020205020404" pitchFamily="49" charset="0"/>
+                <a:cs typeface="Courier New" panose="02070309020205020404" pitchFamily="49" charset="0"/>
+              </a:rPr>
+              <a:t>end</a:t>
+            </a:r>
+            <a:r>
+              <a:rPr lang="en-US" sz="2000" b="1" dirty="0">
+                <a:solidFill>
+                  <a:schemeClr val="tx1"/>
+                </a:solidFill>
+                <a:latin typeface="Courier New" panose="02070309020205020404" pitchFamily="49" charset="0"/>
+                <a:cs typeface="Courier New" panose="02070309020205020404" pitchFamily="49" charset="0"/>
+              </a:rPr>
+              <a:t> </a:t>
+            </a:r>
+          </a:p>
+          <a:p>
+            <a:r>
+              <a:rPr lang="en-US" sz="2000" b="1" dirty="0">
+                <a:solidFill>
+                  <a:schemeClr val="tx1"/>
+                </a:solidFill>
+                <a:latin typeface="Courier New" panose="02070309020205020404" pitchFamily="49" charset="0"/>
+                <a:cs typeface="Courier New" panose="02070309020205020404" pitchFamily="49" charset="0"/>
+              </a:rPr>
+              <a:t>      </a:t>
+            </a:r>
+            <a:r>
+              <a:rPr lang="en-US" sz="2000" b="1" dirty="0">
+                <a:solidFill>
+                  <a:srgbClr val="0070C0"/>
+                </a:solidFill>
+                <a:latin typeface="Courier New" panose="02070309020205020404" pitchFamily="49" charset="0"/>
+                <a:cs typeface="Courier New" panose="02070309020205020404" pitchFamily="49" charset="0"/>
+              </a:rPr>
+              <a:t>end</a:t>
+            </a:r>
+            <a:r>
+              <a:rPr lang="en-US" sz="2000" b="1" dirty="0">
+                <a:solidFill>
+                  <a:schemeClr val="tx1"/>
+                </a:solidFill>
+                <a:latin typeface="Courier New" panose="02070309020205020404" pitchFamily="49" charset="0"/>
+                <a:cs typeface="Courier New" panose="02070309020205020404" pitchFamily="49" charset="0"/>
+              </a:rPr>
+              <a:t> </a:t>
+            </a:r>
+          </a:p>
+          <a:p>
+            <a:r>
+              <a:rPr lang="en-US" sz="2000" b="1" dirty="0">
+                <a:solidFill>
+                  <a:schemeClr val="tx1"/>
+                </a:solidFill>
+                <a:latin typeface="Courier New" panose="02070309020205020404" pitchFamily="49" charset="0"/>
+                <a:cs typeface="Courier New" panose="02070309020205020404" pitchFamily="49" charset="0"/>
+              </a:rPr>
+              <a:t>  end </a:t>
+            </a:r>
+          </a:p>
+        </p:txBody>
+      </p:sp>
+    </p:spTree>
+    <p:extLst>
+      <p:ext uri="{BB962C8B-B14F-4D97-AF65-F5344CB8AC3E}">
+        <p14:creationId xmlns:p14="http://schemas.microsoft.com/office/powerpoint/2010/main" val="2072274817"/>
+      </p:ext>
+    </p:extLst>
+  </p:cSld>
+  <p:clrMapOvr>
+    <a:masterClrMapping/>
+  </p:clrMapOvr>
+</p:sld>
+</file>
+
 <file path=ppt/theme/theme1.xml><?xml version="1.0" encoding="utf-8"?>
 <a:theme xmlns:a="http://schemas.openxmlformats.org/drawingml/2006/main" name="Office Theme">
   <a:themeElements>

</xml_diff>